<commit_message>
Fixed a bug when uploading to http / https. Cleaned up project (removed demos and sourcecode in libs)
</commit_message>
<xml_diff>
--- a/praesentation.pptx
+++ b/praesentation.pptx
@@ -204,7 +204,7 @@
           <a:p>
             <a:fld id="{A722E6A3-D140-5042-8C3F-9AEF74888A6F}" type="datetimeFigureOut">
               <a:rPr lang="de-DE" smtClean="0"/>
-              <a:t>29.06.15</a:t>
+              <a:t>30.06.15, </a:t>
             </a:fld>
             <a:endParaRPr lang="de-DE"/>
           </a:p>
@@ -370,7 +370,7 @@
           <a:p>
             <a:fld id="{3FBD5349-DD2D-9F41-B8CD-79543F541EED}" type="datetimeFigureOut">
               <a:rPr lang="de-DE" smtClean="0"/>
-              <a:t>29.06.15</a:t>
+              <a:t>30.06.15, </a:t>
             </a:fld>
             <a:endParaRPr lang="de-DE"/>
           </a:p>
@@ -846,6 +846,983 @@
 </p:notes>
 </file>
 
+<file path=ppt/notesSlides/notesSlide3.xml><?xml version="1.0" encoding="utf-8"?>
+<p:notes xmlns:a="http://schemas.openxmlformats.org/drawingml/2006/main" xmlns:r="http://schemas.openxmlformats.org/officeDocument/2006/relationships" xmlns:p="http://schemas.openxmlformats.org/presentationml/2006/main">
+  <p:cSld>
+    <p:spTree>
+      <p:nvGrpSpPr>
+        <p:cNvPr id="1" name=""/>
+        <p:cNvGrpSpPr/>
+        <p:nvPr/>
+      </p:nvGrpSpPr>
+      <p:grpSpPr>
+        <a:xfrm>
+          <a:off x="0" y="0"/>
+          <a:ext cx="0" cy="0"/>
+          <a:chOff x="0" y="0"/>
+          <a:chExt cx="0" cy="0"/>
+        </a:xfrm>
+      </p:grpSpPr>
+      <p:sp>
+        <p:nvSpPr>
+          <p:cNvPr id="2" name="Folienbildplatzhalter 1"/>
+          <p:cNvSpPr>
+            <a:spLocks noGrp="1" noRot="1" noChangeAspect="1"/>
+          </p:cNvSpPr>
+          <p:nvPr>
+            <p:ph type="sldImg"/>
+          </p:nvPr>
+        </p:nvSpPr>
+        <p:spPr/>
+      </p:sp>
+      <p:sp>
+        <p:nvSpPr>
+          <p:cNvPr id="3" name="Notizenplatzhalter 2"/>
+          <p:cNvSpPr>
+            <a:spLocks noGrp="1"/>
+          </p:cNvSpPr>
+          <p:nvPr>
+            <p:ph type="body" idx="1"/>
+          </p:nvPr>
+        </p:nvSpPr>
+        <p:spPr/>
+        <p:txBody>
+          <a:bodyPr/>
+          <a:lstStyle/>
+          <a:p>
+            <a:r>
+              <a:rPr lang="de-DE" dirty="0" smtClean="0"/>
+              <a:t>Funktionsumfang:</a:t>
+            </a:r>
+          </a:p>
+          <a:p>
+            <a:r>
+              <a:rPr lang="de-DE" dirty="0" smtClean="0"/>
+              <a:t>1.</a:t>
+            </a:r>
+            <a:r>
+              <a:rPr lang="de-DE" baseline="0" dirty="0" smtClean="0"/>
+              <a:t> Meldung ob Verbindung erfolgreich oder nicht möglich / Beim Abziehen Meldung über </a:t>
+            </a:r>
+            <a:r>
+              <a:rPr lang="de-DE" baseline="0" dirty="0" err="1" smtClean="0"/>
+              <a:t>Disconnect</a:t>
+            </a:r>
+            <a:endParaRPr lang="de-DE" baseline="0" dirty="0" smtClean="0"/>
+          </a:p>
+          <a:p>
+            <a:r>
+              <a:rPr lang="de-DE" baseline="0" dirty="0" smtClean="0"/>
+              <a:t>2. Anzeige der wichtigsten </a:t>
+            </a:r>
+            <a:r>
+              <a:rPr lang="de-DE" baseline="0" dirty="0" err="1" smtClean="0"/>
+              <a:t>Loggereigenschaften</a:t>
+            </a:r>
+            <a:r>
+              <a:rPr lang="de-DE" baseline="0" dirty="0" smtClean="0"/>
+              <a:t>: Version, Name, </a:t>
+            </a:r>
+            <a:r>
+              <a:rPr lang="de-DE" baseline="0" dirty="0" err="1" smtClean="0"/>
+              <a:t>SamplingInt</a:t>
+            </a:r>
+            <a:r>
+              <a:rPr lang="de-DE" baseline="0" dirty="0" smtClean="0"/>
+              <a:t>, Datum, Datum des nächsten Frames, Anzahl an zu erwartenden Frames</a:t>
+            </a:r>
+          </a:p>
+          <a:p>
+            <a:r>
+              <a:rPr lang="de-DE" baseline="0" dirty="0" smtClean="0"/>
+              <a:t>3. Name und </a:t>
+            </a:r>
+            <a:r>
+              <a:rPr lang="de-DE" baseline="0" dirty="0" err="1" smtClean="0"/>
+              <a:t>Samplinginterval</a:t>
+            </a:r>
+            <a:r>
+              <a:rPr lang="de-DE" baseline="0" dirty="0" smtClean="0"/>
+              <a:t> verstellbar</a:t>
+            </a:r>
+          </a:p>
+          <a:p>
+            <a:r>
+              <a:rPr lang="de-DE" baseline="0" dirty="0" smtClean="0"/>
+              <a:t>4. Zeitanzeige </a:t>
+            </a:r>
+            <a:r>
+              <a:rPr lang="de-DE" baseline="0" dirty="0" err="1" smtClean="0"/>
+              <a:t>synchronisierbar</a:t>
+            </a:r>
+            <a:r>
+              <a:rPr lang="de-DE" baseline="0" dirty="0" smtClean="0"/>
+              <a:t> (</a:t>
+            </a:r>
+            <a:r>
+              <a:rPr lang="de-DE" baseline="0" dirty="0" err="1" smtClean="0"/>
+              <a:t>Sync</a:t>
+            </a:r>
+            <a:r>
+              <a:rPr lang="de-DE" baseline="0" dirty="0" smtClean="0"/>
+              <a:t> Button fragt nach Datum und Datum des nächsten Frames und </a:t>
+            </a:r>
+            <a:r>
+              <a:rPr lang="de-DE" baseline="0" dirty="0" err="1" smtClean="0"/>
+              <a:t>updated</a:t>
+            </a:r>
+            <a:r>
+              <a:rPr lang="de-DE" baseline="0" dirty="0" smtClean="0"/>
+              <a:t> die zu erwartenden neuen Frames)</a:t>
+            </a:r>
+          </a:p>
+          <a:p>
+            <a:r>
+              <a:rPr lang="de-DE" baseline="0" dirty="0" smtClean="0"/>
+              <a:t>5. Bei Unterschieden von mehr als 5 Minuten zwischen Systemzeit und </a:t>
+            </a:r>
+            <a:r>
+              <a:rPr lang="de-DE" baseline="0" dirty="0" err="1" smtClean="0"/>
+              <a:t>Loggerzeit</a:t>
+            </a:r>
+            <a:r>
+              <a:rPr lang="de-DE" baseline="0" dirty="0" smtClean="0"/>
+              <a:t> erscheint ein Dialog, ob die Zeit </a:t>
+            </a:r>
+            <a:r>
+              <a:rPr lang="de-DE" baseline="0" dirty="0" err="1" smtClean="0"/>
+              <a:t>resettet</a:t>
+            </a:r>
+            <a:r>
+              <a:rPr lang="de-DE" baseline="0" dirty="0" smtClean="0"/>
+              <a:t> werden soll</a:t>
+            </a:r>
+          </a:p>
+          <a:p>
+            <a:endParaRPr lang="de-DE" baseline="0" dirty="0" smtClean="0"/>
+          </a:p>
+          <a:p>
+            <a:r>
+              <a:rPr lang="de-DE" baseline="0" dirty="0" smtClean="0"/>
+              <a:t>6. Bei </a:t>
+            </a:r>
+            <a:r>
+              <a:rPr lang="de-DE" baseline="0" dirty="0" err="1" smtClean="0"/>
+              <a:t>Dump</a:t>
+            </a:r>
+            <a:r>
+              <a:rPr lang="de-DE" baseline="0" dirty="0" smtClean="0"/>
+              <a:t> Data erscheint ein </a:t>
+            </a:r>
+            <a:r>
+              <a:rPr lang="de-DE" baseline="0" dirty="0" err="1" smtClean="0"/>
+              <a:t>ProgressDialog</a:t>
+            </a:r>
+            <a:r>
+              <a:rPr lang="de-DE" baseline="0" dirty="0" smtClean="0"/>
+              <a:t>, der die ungefähr verbleibende Zeit anzeigt. Der </a:t>
+            </a:r>
+            <a:r>
+              <a:rPr lang="de-DE" baseline="0" dirty="0" err="1" smtClean="0"/>
+              <a:t>Dump</a:t>
+            </a:r>
+            <a:r>
+              <a:rPr lang="de-DE" baseline="0" dirty="0" smtClean="0"/>
+              <a:t> der Daten ist </a:t>
+            </a:r>
+            <a:r>
+              <a:rPr lang="de-DE" baseline="0" dirty="0" err="1" smtClean="0"/>
+              <a:t>abbrechbar</a:t>
+            </a:r>
+            <a:r>
+              <a:rPr lang="de-DE" baseline="0" dirty="0" smtClean="0"/>
+              <a:t>.</a:t>
+            </a:r>
+          </a:p>
+          <a:p>
+            <a:r>
+              <a:rPr lang="de-DE" baseline="0" dirty="0" smtClean="0"/>
+              <a:t>	6.1 Nach erfolgreichem Download der Daten werden die Daten gespeichert(Auch hier </a:t>
+            </a:r>
+            <a:r>
+              <a:rPr lang="de-DE" baseline="0" dirty="0" err="1" smtClean="0"/>
+              <a:t>Progressdialog</a:t>
+            </a:r>
+            <a:r>
+              <a:rPr lang="de-DE" baseline="0" dirty="0" smtClean="0"/>
+              <a:t>)</a:t>
+            </a:r>
+          </a:p>
+          <a:p>
+            <a:r>
+              <a:rPr lang="de-DE" baseline="0" dirty="0" smtClean="0"/>
+              <a:t>	6.2 Nach erfolgreichem Speichern wird der Speicherort und der Dateiname angezeigt.</a:t>
+            </a:r>
+          </a:p>
+          <a:p>
+            <a:r>
+              <a:rPr lang="de-DE" baseline="0" dirty="0" smtClean="0"/>
+              <a:t>7. Bei </a:t>
+            </a:r>
+            <a:r>
+              <a:rPr lang="de-DE" baseline="0" dirty="0" err="1" smtClean="0"/>
+              <a:t>Erase</a:t>
+            </a:r>
+            <a:r>
+              <a:rPr lang="de-DE" baseline="0" dirty="0" smtClean="0"/>
+              <a:t> Data erscheint ein Dialog, der sicherheitshalber noch einmal nachfragt, ob die Daten wirklich gelöscht werden sollen.</a:t>
+            </a:r>
+            <a:endParaRPr lang="de-DE" dirty="0"/>
+          </a:p>
+        </p:txBody>
+      </p:sp>
+      <p:sp>
+        <p:nvSpPr>
+          <p:cNvPr id="4" name="Foliennummernplatzhalter 3"/>
+          <p:cNvSpPr>
+            <a:spLocks noGrp="1"/>
+          </p:cNvSpPr>
+          <p:nvPr>
+            <p:ph type="sldNum" sz="quarter" idx="10"/>
+          </p:nvPr>
+        </p:nvSpPr>
+        <p:spPr/>
+        <p:txBody>
+          <a:bodyPr/>
+          <a:lstStyle/>
+          <a:p>
+            <a:fld id="{31AA76B1-FCC4-874D-A635-4BF9A898008C}" type="slidenum">
+              <a:rPr lang="de-DE" smtClean="0"/>
+              <a:t>6</a:t>
+            </a:fld>
+            <a:endParaRPr lang="de-DE"/>
+          </a:p>
+        </p:txBody>
+      </p:sp>
+    </p:spTree>
+    <p:extLst>
+      <p:ext uri="{BB962C8B-B14F-4D97-AF65-F5344CB8AC3E}">
+        <p14:creationId xmlns:p14="http://schemas.microsoft.com/office/powerpoint/2010/main" val="3082944710"/>
+      </p:ext>
+    </p:extLst>
+  </p:cSld>
+  <p:clrMapOvr>
+    <a:masterClrMapping/>
+  </p:clrMapOvr>
+</p:notes>
+</file>
+
+<file path=ppt/notesSlides/notesSlide4.xml><?xml version="1.0" encoding="utf-8"?>
+<p:notes xmlns:a="http://schemas.openxmlformats.org/drawingml/2006/main" xmlns:r="http://schemas.openxmlformats.org/officeDocument/2006/relationships" xmlns:p="http://schemas.openxmlformats.org/presentationml/2006/main">
+  <p:cSld>
+    <p:spTree>
+      <p:nvGrpSpPr>
+        <p:cNvPr id="1" name=""/>
+        <p:cNvGrpSpPr/>
+        <p:nvPr/>
+      </p:nvGrpSpPr>
+      <p:grpSpPr>
+        <a:xfrm>
+          <a:off x="0" y="0"/>
+          <a:ext cx="0" cy="0"/>
+          <a:chOff x="0" y="0"/>
+          <a:chExt cx="0" cy="0"/>
+        </a:xfrm>
+      </p:grpSpPr>
+      <p:sp>
+        <p:nvSpPr>
+          <p:cNvPr id="2" name="Folienbildplatzhalter 1"/>
+          <p:cNvSpPr>
+            <a:spLocks noGrp="1" noRot="1" noChangeAspect="1"/>
+          </p:cNvSpPr>
+          <p:nvPr>
+            <p:ph type="sldImg"/>
+          </p:nvPr>
+        </p:nvSpPr>
+        <p:spPr/>
+      </p:sp>
+      <p:sp>
+        <p:nvSpPr>
+          <p:cNvPr id="3" name="Notizenplatzhalter 2"/>
+          <p:cNvSpPr>
+            <a:spLocks noGrp="1"/>
+          </p:cNvSpPr>
+          <p:nvPr>
+            <p:ph type="body" idx="1"/>
+          </p:nvPr>
+        </p:nvSpPr>
+        <p:spPr/>
+        <p:txBody>
+          <a:bodyPr/>
+          <a:lstStyle/>
+          <a:p>
+            <a:r>
+              <a:rPr lang="de-DE" dirty="0" smtClean="0"/>
+              <a:t>Funktionsumfang:</a:t>
+            </a:r>
+          </a:p>
+          <a:p>
+            <a:endParaRPr lang="de-DE" dirty="0" smtClean="0"/>
+          </a:p>
+          <a:p>
+            <a:r>
+              <a:rPr lang="de-DE" dirty="0" smtClean="0"/>
+              <a:t>Tabelle:</a:t>
+            </a:r>
+          </a:p>
+          <a:p>
+            <a:pPr marL="228600" indent="-228600">
+              <a:buAutoNum type="arabicPeriod"/>
+            </a:pPr>
+            <a:r>
+              <a:rPr lang="de-DE" dirty="0" smtClean="0"/>
+              <a:t>Anzeige</a:t>
+            </a:r>
+            <a:r>
+              <a:rPr lang="de-DE" baseline="0" dirty="0" smtClean="0"/>
+              <a:t> der .</a:t>
+            </a:r>
+            <a:r>
+              <a:rPr lang="de-DE" baseline="0" dirty="0" err="1" smtClean="0"/>
+              <a:t>db</a:t>
+            </a:r>
+            <a:r>
+              <a:rPr lang="de-DE" baseline="0" dirty="0" smtClean="0"/>
+              <a:t> Files, die durch einen </a:t>
+            </a:r>
+            <a:r>
+              <a:rPr lang="de-DE" baseline="0" dirty="0" err="1" smtClean="0"/>
+              <a:t>Dump</a:t>
+            </a:r>
+            <a:r>
+              <a:rPr lang="de-DE" baseline="0" dirty="0" smtClean="0"/>
+              <a:t> auf dem Gerät gespeichert wurden.</a:t>
+            </a:r>
+          </a:p>
+          <a:p>
+            <a:pPr marL="685800" lvl="1" indent="-228600">
+              <a:buAutoNum type="arabicPeriod"/>
+            </a:pPr>
+            <a:r>
+              <a:rPr lang="de-DE" baseline="0" dirty="0" smtClean="0"/>
+              <a:t>Name des Loggers</a:t>
+            </a:r>
+          </a:p>
+          <a:p>
+            <a:pPr marL="685800" lvl="1" indent="-228600">
+              <a:buAutoNum type="arabicPeriod"/>
+            </a:pPr>
+            <a:r>
+              <a:rPr lang="de-DE" baseline="0" dirty="0" smtClean="0"/>
+              <a:t>Start- und Endzeit der Frames dieses </a:t>
+            </a:r>
+            <a:r>
+              <a:rPr lang="de-DE" baseline="0" dirty="0" err="1" smtClean="0"/>
+              <a:t>Dumps</a:t>
+            </a:r>
+            <a:endParaRPr lang="de-DE" baseline="0" dirty="0" smtClean="0"/>
+          </a:p>
+          <a:p>
+            <a:pPr marL="685800" lvl="1" indent="-228600">
+              <a:buAutoNum type="arabicPeriod"/>
+            </a:pPr>
+            <a:r>
+              <a:rPr lang="de-DE" baseline="0" dirty="0" smtClean="0"/>
+              <a:t>Anzahl von Frames</a:t>
+            </a:r>
+            <a:endParaRPr lang="de-DE" baseline="0" dirty="0" smtClean="0"/>
+          </a:p>
+          <a:p>
+            <a:pPr marL="228600" indent="-228600">
+              <a:buAutoNum type="arabicPeriod"/>
+            </a:pPr>
+            <a:r>
+              <a:rPr lang="de-DE" baseline="0" dirty="0" smtClean="0"/>
+              <a:t>Auswahl eines oder mehrerer Frames durch </a:t>
+            </a:r>
+            <a:r>
+              <a:rPr lang="de-DE" baseline="0" dirty="0" err="1" smtClean="0"/>
+              <a:t>Tap</a:t>
+            </a:r>
+            <a:r>
+              <a:rPr lang="de-DE" baseline="0" dirty="0" smtClean="0"/>
+              <a:t> auf die Zeile möglich</a:t>
+            </a:r>
+          </a:p>
+          <a:p>
+            <a:pPr marL="228600" indent="-228600">
+              <a:buAutoNum type="arabicPeriod"/>
+            </a:pPr>
+            <a:r>
+              <a:rPr lang="de-DE" baseline="0" dirty="0" smtClean="0"/>
+              <a:t>Bei vielen Einträgen ist die Tabelle </a:t>
+            </a:r>
+            <a:r>
+              <a:rPr lang="de-DE" baseline="0" dirty="0" err="1" smtClean="0"/>
+              <a:t>scrollbar</a:t>
+            </a:r>
+            <a:endParaRPr lang="de-DE" baseline="0" dirty="0" smtClean="0"/>
+          </a:p>
+          <a:p>
+            <a:pPr marL="228600" indent="-228600">
+              <a:buAutoNum type="arabicPeriod"/>
+            </a:pPr>
+            <a:endParaRPr lang="de-DE" baseline="0" dirty="0" smtClean="0"/>
+          </a:p>
+          <a:p>
+            <a:pPr marL="0" marR="0" indent="0" algn="l" defTabSz="457200" rtl="0" eaLnBrk="1" fontAlgn="auto" latinLnBrk="0" hangingPunct="1">
+              <a:lnSpc>
+                <a:spcPct val="100000"/>
+              </a:lnSpc>
+              <a:spcBef>
+                <a:spcPts val="0"/>
+              </a:spcBef>
+              <a:spcAft>
+                <a:spcPts val="0"/>
+              </a:spcAft>
+              <a:buClrTx/>
+              <a:buSzTx/>
+              <a:buFontTx/>
+              <a:buNone/>
+              <a:tabLst/>
+              <a:defRPr/>
+            </a:pPr>
+            <a:r>
+              <a:rPr lang="de-DE" baseline="0" dirty="0" err="1" smtClean="0"/>
+              <a:t>Menubar</a:t>
+            </a:r>
+            <a:r>
+              <a:rPr lang="de-DE" baseline="0" dirty="0" smtClean="0"/>
+              <a:t> unten: </a:t>
+            </a:r>
+          </a:p>
+          <a:p>
+            <a:pPr marL="228600" indent="-228600">
+              <a:buAutoNum type="arabicPeriod"/>
+            </a:pPr>
+            <a:r>
+              <a:rPr lang="de-DE" baseline="0" dirty="0" smtClean="0"/>
+              <a:t>Tabelle </a:t>
+            </a:r>
+            <a:r>
+              <a:rPr lang="de-DE" baseline="0" dirty="0" err="1" smtClean="0"/>
+              <a:t>akutalisieren</a:t>
+            </a:r>
+            <a:r>
+              <a:rPr lang="de-DE" baseline="0" dirty="0" smtClean="0"/>
+              <a:t>, falls der User per Hand außerhalb der App Daten gelöscht hat </a:t>
+            </a:r>
+          </a:p>
+          <a:p>
+            <a:pPr marL="228600" indent="-228600">
+              <a:buAutoNum type="arabicPeriod"/>
+            </a:pPr>
+            <a:r>
+              <a:rPr lang="de-DE" baseline="0" dirty="0" smtClean="0"/>
+              <a:t>Alle Einträge in der Tabelle anwählen bzw. abwählen.</a:t>
+            </a:r>
+          </a:p>
+          <a:p>
+            <a:pPr marL="228600" indent="-228600">
+              <a:buAutoNum type="arabicPeriod"/>
+            </a:pPr>
+            <a:r>
+              <a:rPr lang="de-DE" baseline="0" dirty="0" smtClean="0"/>
+              <a:t>Daten löschen</a:t>
+            </a:r>
+          </a:p>
+          <a:p>
+            <a:pPr marL="685800" lvl="1" indent="-228600">
+              <a:buAutoNum type="arabicPeriod"/>
+            </a:pPr>
+            <a:r>
+              <a:rPr lang="de-DE" baseline="0" dirty="0" smtClean="0"/>
+              <a:t>Dialog, um das Löschen zu bestätigen</a:t>
+            </a:r>
+          </a:p>
+          <a:p>
+            <a:pPr marL="0" indent="0">
+              <a:buNone/>
+            </a:pPr>
+            <a:endParaRPr lang="de-DE" baseline="0" dirty="0" smtClean="0"/>
+          </a:p>
+          <a:p>
+            <a:pPr marL="0" indent="0">
+              <a:buNone/>
+            </a:pPr>
+            <a:r>
+              <a:rPr lang="de-DE" baseline="0" dirty="0" err="1" smtClean="0"/>
+              <a:t>Menubar</a:t>
+            </a:r>
+            <a:r>
+              <a:rPr lang="de-DE" baseline="0" dirty="0" smtClean="0"/>
+              <a:t> oben:</a:t>
+            </a:r>
+          </a:p>
+          <a:p>
+            <a:pPr marL="228600" indent="-228600">
+              <a:buAutoNum type="arabicPeriod"/>
+            </a:pPr>
+            <a:r>
+              <a:rPr lang="de-DE" baseline="0" dirty="0" smtClean="0"/>
+              <a:t>Konvertierung der Daten in CSV Format (schnell und platzsparend), um sie dann in </a:t>
+            </a:r>
+            <a:r>
+              <a:rPr lang="de-DE" baseline="0" dirty="0" err="1" smtClean="0"/>
+              <a:t>zB</a:t>
+            </a:r>
+            <a:r>
+              <a:rPr lang="de-DE" baseline="0" dirty="0" smtClean="0"/>
+              <a:t> Excel zu importieren</a:t>
+            </a:r>
+          </a:p>
+          <a:p>
+            <a:pPr marL="685800" lvl="1" indent="-228600">
+              <a:buAutoNum type="arabicPeriod"/>
+            </a:pPr>
+            <a:r>
+              <a:rPr lang="de-DE" baseline="0" dirty="0" smtClean="0"/>
+              <a:t>Informieren des Users, ob diese Datei bereits konvertiert wurde. Diese Dateien werden nicht erneut konvertiert.</a:t>
+            </a:r>
+          </a:p>
+          <a:p>
+            <a:pPr marL="685800" lvl="1" indent="-228600">
+              <a:buAutoNum type="arabicPeriod"/>
+            </a:pPr>
+            <a:r>
+              <a:rPr lang="de-DE" baseline="0" dirty="0" err="1" smtClean="0"/>
+              <a:t>ProgressDialog</a:t>
+            </a:r>
+            <a:r>
+              <a:rPr lang="de-DE" baseline="0" dirty="0" smtClean="0"/>
+              <a:t> mit anschließender Anzeige der Dateinamen und des Speicherortes.</a:t>
+            </a:r>
+            <a:endParaRPr lang="de-DE" baseline="0" dirty="0" smtClean="0"/>
+          </a:p>
+          <a:p>
+            <a:pPr marL="228600" indent="-228600">
+              <a:buAutoNum type="arabicPeriod"/>
+            </a:pPr>
+            <a:r>
+              <a:rPr lang="de-DE" baseline="0" dirty="0" smtClean="0"/>
+              <a:t>Upload der Daten in die </a:t>
+            </a:r>
+            <a:r>
+              <a:rPr lang="de-DE" baseline="0" dirty="0" err="1" smtClean="0"/>
+              <a:t>BayEOS</a:t>
+            </a:r>
+            <a:r>
+              <a:rPr lang="de-DE" baseline="0" dirty="0" smtClean="0"/>
+              <a:t> Gateway</a:t>
+            </a:r>
+          </a:p>
+          <a:p>
+            <a:pPr marL="685800" lvl="1" indent="-228600">
+              <a:buAutoNum type="arabicPeriod"/>
+            </a:pPr>
+            <a:r>
+              <a:rPr lang="de-DE" baseline="0" dirty="0" smtClean="0"/>
+              <a:t>Anzeige der Files und deren Dateigrößen, dann </a:t>
+            </a:r>
+            <a:r>
+              <a:rPr lang="de-DE" baseline="0" dirty="0" err="1" smtClean="0"/>
+              <a:t>ProgressDialog</a:t>
+            </a:r>
+            <a:r>
+              <a:rPr lang="de-DE" baseline="0" dirty="0" smtClean="0"/>
+              <a:t> (</a:t>
+            </a:r>
+            <a:r>
+              <a:rPr lang="de-DE" baseline="0" dirty="0" err="1" smtClean="0"/>
+              <a:t>abbrechbar</a:t>
+            </a:r>
+            <a:r>
+              <a:rPr lang="de-DE" baseline="0" dirty="0" smtClean="0"/>
+              <a:t>)</a:t>
+            </a:r>
+          </a:p>
+          <a:p>
+            <a:pPr marL="685800" lvl="1" indent="-228600">
+              <a:buAutoNum type="arabicPeriod"/>
+            </a:pPr>
+            <a:r>
+              <a:rPr lang="de-DE" baseline="0" dirty="0" smtClean="0"/>
+              <a:t>Nach Beenden des Uploads anzeige des HTTP Status Codes, um den User über Erfolg bzw. Misserfolg zu informieren.</a:t>
+            </a:r>
+          </a:p>
+          <a:p>
+            <a:pPr marL="685800" lvl="1" indent="-228600">
+              <a:buAutoNum type="arabicPeriod"/>
+            </a:pPr>
+            <a:r>
+              <a:rPr lang="de-DE" baseline="0" dirty="0" smtClean="0"/>
+              <a:t>Checkbox, um dem User die Möglichkeit zu geben, die hochgeladenen Daten vom Gerät (und der Tabelle) zu löschen.</a:t>
+            </a:r>
+          </a:p>
+          <a:p>
+            <a:pPr marL="685800" lvl="1" indent="-228600">
+              <a:buAutoNum type="arabicPeriod"/>
+            </a:pPr>
+            <a:endParaRPr lang="de-DE" baseline="0" dirty="0" smtClean="0"/>
+          </a:p>
+          <a:p>
+            <a:pPr marL="457200" lvl="1" indent="0">
+              <a:buNone/>
+            </a:pPr>
+            <a:endParaRPr lang="de-DE" baseline="0" dirty="0" smtClean="0"/>
+          </a:p>
+          <a:p>
+            <a:pPr marL="457200" lvl="1" indent="0">
+              <a:buNone/>
+            </a:pPr>
+            <a:endParaRPr lang="de-DE" baseline="0" dirty="0" smtClean="0"/>
+          </a:p>
+          <a:p>
+            <a:pPr marL="457200" lvl="1" indent="0">
+              <a:buNone/>
+            </a:pPr>
+            <a:endParaRPr lang="de-DE" baseline="0" dirty="0" smtClean="0"/>
+          </a:p>
+        </p:txBody>
+      </p:sp>
+      <p:sp>
+        <p:nvSpPr>
+          <p:cNvPr id="4" name="Foliennummernplatzhalter 3"/>
+          <p:cNvSpPr>
+            <a:spLocks noGrp="1"/>
+          </p:cNvSpPr>
+          <p:nvPr>
+            <p:ph type="sldNum" sz="quarter" idx="10"/>
+          </p:nvPr>
+        </p:nvSpPr>
+        <p:spPr/>
+        <p:txBody>
+          <a:bodyPr/>
+          <a:lstStyle/>
+          <a:p>
+            <a:fld id="{31AA76B1-FCC4-874D-A635-4BF9A898008C}" type="slidenum">
+              <a:rPr lang="de-DE" smtClean="0"/>
+              <a:t>7</a:t>
+            </a:fld>
+            <a:endParaRPr lang="de-DE"/>
+          </a:p>
+        </p:txBody>
+      </p:sp>
+    </p:spTree>
+    <p:extLst>
+      <p:ext uri="{BB962C8B-B14F-4D97-AF65-F5344CB8AC3E}">
+        <p14:creationId xmlns:p14="http://schemas.microsoft.com/office/powerpoint/2010/main" val="1599864645"/>
+      </p:ext>
+    </p:extLst>
+  </p:cSld>
+  <p:clrMapOvr>
+    <a:masterClrMapping/>
+  </p:clrMapOvr>
+</p:notes>
+</file>
+
+<file path=ppt/notesSlides/notesSlide5.xml><?xml version="1.0" encoding="utf-8"?>
+<p:notes xmlns:a="http://schemas.openxmlformats.org/drawingml/2006/main" xmlns:r="http://schemas.openxmlformats.org/officeDocument/2006/relationships" xmlns:p="http://schemas.openxmlformats.org/presentationml/2006/main">
+  <p:cSld>
+    <p:spTree>
+      <p:nvGrpSpPr>
+        <p:cNvPr id="1" name=""/>
+        <p:cNvGrpSpPr/>
+        <p:nvPr/>
+      </p:nvGrpSpPr>
+      <p:grpSpPr>
+        <a:xfrm>
+          <a:off x="0" y="0"/>
+          <a:ext cx="0" cy="0"/>
+          <a:chOff x="0" y="0"/>
+          <a:chExt cx="0" cy="0"/>
+        </a:xfrm>
+      </p:grpSpPr>
+      <p:sp>
+        <p:nvSpPr>
+          <p:cNvPr id="2" name="Folienbildplatzhalter 1"/>
+          <p:cNvSpPr>
+            <a:spLocks noGrp="1" noRot="1" noChangeAspect="1"/>
+          </p:cNvSpPr>
+          <p:nvPr>
+            <p:ph type="sldImg"/>
+          </p:nvPr>
+        </p:nvSpPr>
+        <p:spPr/>
+      </p:sp>
+      <p:sp>
+        <p:nvSpPr>
+          <p:cNvPr id="3" name="Notizenplatzhalter 2"/>
+          <p:cNvSpPr>
+            <a:spLocks noGrp="1"/>
+          </p:cNvSpPr>
+          <p:nvPr>
+            <p:ph type="body" idx="1"/>
+          </p:nvPr>
+        </p:nvSpPr>
+        <p:spPr/>
+        <p:txBody>
+          <a:bodyPr/>
+          <a:lstStyle/>
+          <a:p>
+            <a:r>
+              <a:rPr lang="de-DE" dirty="0" smtClean="0"/>
+              <a:t>Funktionsumfang:</a:t>
+            </a:r>
+          </a:p>
+          <a:p>
+            <a:endParaRPr lang="de-DE" dirty="0" smtClean="0"/>
+          </a:p>
+          <a:p>
+            <a:pPr marL="228600" indent="-228600">
+              <a:buAutoNum type="arabicPeriod"/>
+            </a:pPr>
+            <a:r>
+              <a:rPr lang="de-DE" dirty="0" smtClean="0"/>
+              <a:t>Starten</a:t>
+            </a:r>
+            <a:r>
+              <a:rPr lang="de-DE" baseline="0" dirty="0" smtClean="0"/>
+              <a:t> bzw. Stoppen des Live Modus. </a:t>
+            </a:r>
+          </a:p>
+          <a:p>
+            <a:pPr marL="228600" indent="-228600">
+              <a:buAutoNum type="arabicPeriod"/>
+            </a:pPr>
+            <a:r>
+              <a:rPr lang="de-DE" baseline="0" dirty="0" smtClean="0"/>
+              <a:t>Anzeige der gesendeten Daten jedes Channels unter Anzeige der Werte und Zeitstempel </a:t>
+            </a:r>
+          </a:p>
+          <a:p>
+            <a:pPr marL="228600" indent="-228600">
+              <a:buAutoNum type="arabicPeriod"/>
+            </a:pPr>
+            <a:r>
+              <a:rPr lang="de-DE" baseline="0" dirty="0" smtClean="0"/>
+              <a:t>Der Live Modus läuft auch weiter, wenn man zu den Reitern </a:t>
+            </a:r>
+            <a:r>
+              <a:rPr lang="de-DE" baseline="0" dirty="0" err="1" smtClean="0"/>
+              <a:t>Dumps</a:t>
+            </a:r>
+            <a:r>
+              <a:rPr lang="de-DE" baseline="0" dirty="0" smtClean="0"/>
+              <a:t> und </a:t>
+            </a:r>
+            <a:r>
+              <a:rPr lang="de-DE" baseline="0" dirty="0" err="1" smtClean="0"/>
+              <a:t>Preferences</a:t>
+            </a:r>
+            <a:r>
+              <a:rPr lang="de-DE" baseline="0" dirty="0" smtClean="0"/>
+              <a:t> wechselt, wird jedoch automatisch gestoppt, wenn man zum Reiter Logger wechselt</a:t>
+            </a:r>
+          </a:p>
+          <a:p>
+            <a:pPr marL="0" indent="0">
+              <a:buNone/>
+            </a:pPr>
+            <a:endParaRPr lang="de-DE" baseline="0" dirty="0" smtClean="0"/>
+          </a:p>
+        </p:txBody>
+      </p:sp>
+      <p:sp>
+        <p:nvSpPr>
+          <p:cNvPr id="4" name="Foliennummernplatzhalter 3"/>
+          <p:cNvSpPr>
+            <a:spLocks noGrp="1"/>
+          </p:cNvSpPr>
+          <p:nvPr>
+            <p:ph type="sldNum" sz="quarter" idx="10"/>
+          </p:nvPr>
+        </p:nvSpPr>
+        <p:spPr/>
+        <p:txBody>
+          <a:bodyPr/>
+          <a:lstStyle/>
+          <a:p>
+            <a:fld id="{31AA76B1-FCC4-874D-A635-4BF9A898008C}" type="slidenum">
+              <a:rPr lang="de-DE" smtClean="0"/>
+              <a:t>8</a:t>
+            </a:fld>
+            <a:endParaRPr lang="de-DE"/>
+          </a:p>
+        </p:txBody>
+      </p:sp>
+    </p:spTree>
+    <p:extLst>
+      <p:ext uri="{BB962C8B-B14F-4D97-AF65-F5344CB8AC3E}">
+        <p14:creationId xmlns:p14="http://schemas.microsoft.com/office/powerpoint/2010/main" val="343342018"/>
+      </p:ext>
+    </p:extLst>
+  </p:cSld>
+  <p:clrMapOvr>
+    <a:masterClrMapping/>
+  </p:clrMapOvr>
+</p:notes>
+</file>
+
+<file path=ppt/notesSlides/notesSlide6.xml><?xml version="1.0" encoding="utf-8"?>
+<p:notes xmlns:a="http://schemas.openxmlformats.org/drawingml/2006/main" xmlns:r="http://schemas.openxmlformats.org/officeDocument/2006/relationships" xmlns:p="http://schemas.openxmlformats.org/presentationml/2006/main">
+  <p:cSld>
+    <p:spTree>
+      <p:nvGrpSpPr>
+        <p:cNvPr id="1" name=""/>
+        <p:cNvGrpSpPr/>
+        <p:nvPr/>
+      </p:nvGrpSpPr>
+      <p:grpSpPr>
+        <a:xfrm>
+          <a:off x="0" y="0"/>
+          <a:ext cx="0" cy="0"/>
+          <a:chOff x="0" y="0"/>
+          <a:chExt cx="0" cy="0"/>
+        </a:xfrm>
+      </p:grpSpPr>
+      <p:sp>
+        <p:nvSpPr>
+          <p:cNvPr id="2" name="Folienbildplatzhalter 1"/>
+          <p:cNvSpPr>
+            <a:spLocks noGrp="1" noRot="1" noChangeAspect="1"/>
+          </p:cNvSpPr>
+          <p:nvPr>
+            <p:ph type="sldImg"/>
+          </p:nvPr>
+        </p:nvSpPr>
+        <p:spPr/>
+      </p:sp>
+      <p:sp>
+        <p:nvSpPr>
+          <p:cNvPr id="3" name="Notizenplatzhalter 2"/>
+          <p:cNvSpPr>
+            <a:spLocks noGrp="1"/>
+          </p:cNvSpPr>
+          <p:nvPr>
+            <p:ph type="body" idx="1"/>
+          </p:nvPr>
+        </p:nvSpPr>
+        <p:spPr/>
+        <p:txBody>
+          <a:bodyPr/>
+          <a:lstStyle/>
+          <a:p>
+            <a:r>
+              <a:rPr lang="de-DE" dirty="0" smtClean="0"/>
+              <a:t>Funktionsumfang:</a:t>
+            </a:r>
+          </a:p>
+          <a:p>
+            <a:r>
+              <a:rPr lang="de-DE" dirty="0" smtClean="0"/>
+              <a:t>Diese</a:t>
+            </a:r>
+            <a:r>
+              <a:rPr lang="de-DE" baseline="0" dirty="0" smtClean="0"/>
+              <a:t> Einstellungen werden über das Beenden der App hinaus gespeichert und müssen vom User nur ein mal nach der Installation der App festgelegt werden</a:t>
+            </a:r>
+            <a:endParaRPr lang="de-DE" dirty="0" smtClean="0"/>
+          </a:p>
+          <a:p>
+            <a:pPr marL="228600" indent="-228600">
+              <a:buAutoNum type="arabicPeriod"/>
+            </a:pPr>
+            <a:r>
+              <a:rPr lang="de-DE" baseline="0" dirty="0" smtClean="0"/>
+              <a:t>Festlegen und Speichern der Usereinstellungen, die nötig sind, um Daten in die Gateway zu schieben: </a:t>
+            </a:r>
+          </a:p>
+          <a:p>
+            <a:pPr marL="685800" lvl="1" indent="-228600">
+              <a:buAutoNum type="arabicPeriod"/>
+            </a:pPr>
+            <a:r>
+              <a:rPr lang="de-DE" baseline="0" dirty="0" smtClean="0"/>
+              <a:t>Username, Passwort, Host und Path. </a:t>
+            </a:r>
+          </a:p>
+          <a:p>
+            <a:pPr marL="685800" lvl="1" indent="-228600">
+              <a:buAutoNum type="arabicPeriod"/>
+            </a:pPr>
+            <a:r>
+              <a:rPr lang="de-DE" baseline="0" dirty="0" smtClean="0"/>
+              <a:t>Als </a:t>
+            </a:r>
+            <a:r>
+              <a:rPr lang="de-DE" baseline="0" dirty="0" err="1" smtClean="0"/>
+              <a:t>Defaultwert</a:t>
+            </a:r>
+            <a:r>
+              <a:rPr lang="de-DE" baseline="0" dirty="0" smtClean="0"/>
+              <a:t> für Host und Path ist die </a:t>
+            </a:r>
+            <a:r>
+              <a:rPr lang="de-DE" baseline="0" dirty="0" err="1" smtClean="0"/>
+              <a:t>BayEOS</a:t>
+            </a:r>
+            <a:r>
+              <a:rPr lang="de-DE" baseline="0" dirty="0" smtClean="0"/>
+              <a:t> Gateway voreingestellt</a:t>
+            </a:r>
+            <a:endParaRPr lang="de-DE" dirty="0" smtClean="0"/>
+          </a:p>
+          <a:p>
+            <a:pPr marL="228600" indent="-228600">
+              <a:buAutoNum type="arabicPeriod"/>
+            </a:pPr>
+            <a:r>
+              <a:rPr lang="de-DE" baseline="0" dirty="0" smtClean="0"/>
+              <a:t>Checkbox, ob die Vorgänge in der App in ein Log File gespeichert werden sollen</a:t>
+            </a:r>
+            <a:r>
+              <a:rPr lang="de-DE" baseline="0" smtClean="0"/>
+              <a:t>, welches bei </a:t>
+            </a:r>
+            <a:r>
+              <a:rPr lang="de-DE" baseline="0" dirty="0" smtClean="0"/>
+              <a:t>der Fehlerbehebung sehr hilfreich sein kann.</a:t>
+            </a:r>
+          </a:p>
+        </p:txBody>
+      </p:sp>
+      <p:sp>
+        <p:nvSpPr>
+          <p:cNvPr id="4" name="Foliennummernplatzhalter 3"/>
+          <p:cNvSpPr>
+            <a:spLocks noGrp="1"/>
+          </p:cNvSpPr>
+          <p:nvPr>
+            <p:ph type="sldNum" sz="quarter" idx="10"/>
+          </p:nvPr>
+        </p:nvSpPr>
+        <p:spPr/>
+        <p:txBody>
+          <a:bodyPr/>
+          <a:lstStyle/>
+          <a:p>
+            <a:fld id="{31AA76B1-FCC4-874D-A635-4BF9A898008C}" type="slidenum">
+              <a:rPr lang="de-DE" smtClean="0"/>
+              <a:t>9</a:t>
+            </a:fld>
+            <a:endParaRPr lang="de-DE"/>
+          </a:p>
+        </p:txBody>
+      </p:sp>
+    </p:spTree>
+    <p:extLst>
+      <p:ext uri="{BB962C8B-B14F-4D97-AF65-F5344CB8AC3E}">
+        <p14:creationId xmlns:p14="http://schemas.microsoft.com/office/powerpoint/2010/main" val="2132767130"/>
+      </p:ext>
+    </p:extLst>
+  </p:cSld>
+  <p:clrMapOvr>
+    <a:masterClrMapping/>
+  </p:clrMapOvr>
+</p:notes>
+</file>
+
 <file path=ppt/slideLayouts/slideLayout1.xml><?xml version="1.0" encoding="utf-8"?>
 <p:sldLayout xmlns:a="http://schemas.openxmlformats.org/drawingml/2006/main" xmlns:r="http://schemas.openxmlformats.org/officeDocument/2006/relationships" xmlns:p="http://schemas.openxmlformats.org/presentationml/2006/main" type="title" preserve="1">
   <p:cSld name="Titelfolie">
@@ -1027,7 +2004,7 @@
           <a:p>
             <a:fld id="{7C926B98-E9D7-A34E-8AA7-F126785D97E4}" type="datetime1">
               <a:rPr lang="de-DE" smtClean="0"/>
-              <a:t>29.06.15</a:t>
+              <a:t>30.06.15, </a:t>
             </a:fld>
             <a:endParaRPr lang="de-DE"/>
           </a:p>
@@ -1201,7 +2178,7 @@
           <a:p>
             <a:fld id="{99CD3F68-F797-7541-A4E1-E2EF9762BF1C}" type="datetime1">
               <a:rPr lang="de-DE" smtClean="0"/>
-              <a:t>29.06.15</a:t>
+              <a:t>30.06.15, </a:t>
             </a:fld>
             <a:endParaRPr lang="de-DE"/>
           </a:p>
@@ -1385,7 +2362,7 @@
           <a:p>
             <a:fld id="{722AF9DC-5939-E74E-BC0E-FB627F0F1B62}" type="datetime1">
               <a:rPr lang="de-DE" smtClean="0"/>
-              <a:t>29.06.15</a:t>
+              <a:t>30.06.15, </a:t>
             </a:fld>
             <a:endParaRPr lang="de-DE"/>
           </a:p>
@@ -1559,7 +2536,7 @@
           <a:p>
             <a:fld id="{B71E311C-0A10-D341-90A8-C9500DF18AB5}" type="datetime1">
               <a:rPr lang="de-DE" smtClean="0"/>
-              <a:t>29.06.15</a:t>
+              <a:t>30.06.15, </a:t>
             </a:fld>
             <a:endParaRPr lang="de-DE"/>
           </a:p>
@@ -1809,7 +2786,7 @@
           <a:p>
             <a:fld id="{2E2D05D0-FD24-534B-AAD2-840199265390}" type="datetime1">
               <a:rPr lang="de-DE" smtClean="0"/>
-              <a:t>29.06.15</a:t>
+              <a:t>30.06.15, </a:t>
             </a:fld>
             <a:endParaRPr lang="de-DE"/>
           </a:p>
@@ -2101,7 +3078,7 @@
           <a:p>
             <a:fld id="{756782A7-7172-2E47-BE50-0637159CF4DC}" type="datetime1">
               <a:rPr lang="de-DE" smtClean="0"/>
-              <a:t>29.06.15</a:t>
+              <a:t>30.06.15, </a:t>
             </a:fld>
             <a:endParaRPr lang="de-DE"/>
           </a:p>
@@ -2527,7 +3504,7 @@
           <a:p>
             <a:fld id="{DBF1D831-A3F5-6040-83A2-71994EA1EAEA}" type="datetime1">
               <a:rPr lang="de-DE" smtClean="0"/>
-              <a:t>29.06.15</a:t>
+              <a:t>30.06.15, </a:t>
             </a:fld>
             <a:endParaRPr lang="de-DE"/>
           </a:p>
@@ -2649,7 +3626,7 @@
           <a:p>
             <a:fld id="{55A68374-4AF3-4F48-B50E-A23B13C5663A}" type="datetime1">
               <a:rPr lang="de-DE" smtClean="0"/>
-              <a:t>29.06.15</a:t>
+              <a:t>30.06.15, </a:t>
             </a:fld>
             <a:endParaRPr lang="de-DE"/>
           </a:p>
@@ -2748,7 +3725,7 @@
           <a:p>
             <a:fld id="{DADF60EB-7248-6341-B891-59C0112BC4D1}" type="datetime1">
               <a:rPr lang="de-DE" smtClean="0"/>
-              <a:t>29.06.15</a:t>
+              <a:t>30.06.15, </a:t>
             </a:fld>
             <a:endParaRPr lang="de-DE"/>
           </a:p>
@@ -3029,7 +4006,7 @@
           <a:p>
             <a:fld id="{6A5CF1F7-6082-BA4A-B9A8-85B4892BEC31}" type="datetime1">
               <a:rPr lang="de-DE" smtClean="0"/>
-              <a:t>29.06.15</a:t>
+              <a:t>30.06.15, </a:t>
             </a:fld>
             <a:endParaRPr lang="de-DE"/>
           </a:p>
@@ -3286,7 +4263,7 @@
           <a:p>
             <a:fld id="{1CAB2D1B-8563-4A48-9F63-56FE6E33D0A9}" type="datetime1">
               <a:rPr lang="de-DE" smtClean="0"/>
-              <a:t>29.06.15</a:t>
+              <a:t>30.06.15, </a:t>
             </a:fld>
             <a:endParaRPr lang="de-DE"/>
           </a:p>
@@ -3503,7 +4480,7 @@
           <a:p>
             <a:fld id="{5C316E07-3905-C64E-AC6D-A8B5FC045255}" type="datetime1">
               <a:rPr lang="de-DE" smtClean="0"/>
-              <a:t>29.06.15</a:t>
+              <a:t>30.06.15, </a:t>
             </a:fld>
             <a:endParaRPr lang="de-DE"/>
           </a:p>
@@ -3990,8 +4967,8 @@
           <a:lstStyle/>
           <a:p>
             <a:r>
-              <a:rPr lang="de-DE" dirty="0" smtClean="0"/>
-              <a:t>Demo</a:t>
+              <a:rPr lang="de-DE" smtClean="0"/>
+              <a:t>5. Demo</a:t>
             </a:r>
             <a:endParaRPr lang="de-DE" dirty="0"/>
           </a:p>
@@ -4033,7 +5010,7 @@
           <a:p>
             <a:fld id="{B71E311C-0A10-D341-90A8-C9500DF18AB5}" type="datetime1">
               <a:rPr lang="de-DE" smtClean="0"/>
-              <a:t>29.06.15</a:t>
+              <a:t>30.06.15, </a:t>
             </a:fld>
             <a:endParaRPr lang="de-DE"/>
           </a:p>
@@ -4226,7 +5203,7 @@
           <a:p>
             <a:fld id="{B71E311C-0A10-D341-90A8-C9500DF18AB5}" type="datetime1">
               <a:rPr lang="de-DE" smtClean="0"/>
-              <a:t>29.06.15</a:t>
+              <a:t>30.06.15, </a:t>
             </a:fld>
             <a:endParaRPr lang="de-DE"/>
           </a:p>
@@ -4325,7 +5302,7 @@
           <a:p>
             <a:r>
               <a:rPr lang="de-DE" dirty="0" smtClean="0"/>
-              <a:t>Aufgabe</a:t>
+              <a:t>1. Aufgabe</a:t>
             </a:r>
             <a:endParaRPr lang="de-DE" dirty="0"/>
           </a:p>
@@ -4434,7 +5411,7 @@
           <a:p>
             <a:fld id="{B71E311C-0A10-D341-90A8-C9500DF18AB5}" type="datetime1">
               <a:rPr lang="de-DE" smtClean="0"/>
-              <a:t>29.06.15</a:t>
+              <a:t>30.06.15, </a:t>
             </a:fld>
             <a:endParaRPr lang="de-DE"/>
           </a:p>
@@ -4541,7 +5518,7 @@
           <a:p>
             <a:r>
               <a:rPr lang="de-DE" dirty="0" smtClean="0"/>
-              <a:t>Motivation</a:t>
+              <a:t>2. Motivation</a:t>
             </a:r>
             <a:endParaRPr lang="de-DE" dirty="0"/>
           </a:p>
@@ -4578,7 +5555,6 @@
               <a:rPr lang="de-DE" dirty="0" smtClean="0"/>
               <a:t>? </a:t>
             </a:r>
-            <a:endParaRPr lang="de-DE" dirty="0" smtClean="0"/>
           </a:p>
         </p:txBody>
       </p:sp>
@@ -4599,7 +5575,7 @@
           <a:p>
             <a:fld id="{B71E311C-0A10-D341-90A8-C9500DF18AB5}" type="datetime1">
               <a:rPr lang="de-DE" smtClean="0"/>
-              <a:t>29.06.15</a:t>
+              <a:t>30.06.15, </a:t>
             </a:fld>
             <a:endParaRPr lang="de-DE"/>
           </a:p>
@@ -4698,7 +5674,7 @@
           <a:p>
             <a:r>
               <a:rPr lang="de-DE" dirty="0" smtClean="0"/>
-              <a:t>Existierende Java-Anwendung</a:t>
+              <a:t>3. Existierende Java-Anwendung</a:t>
             </a:r>
             <a:endParaRPr lang="de-DE" dirty="0"/>
           </a:p>
@@ -4744,7 +5720,7 @@
           <a:p>
             <a:fld id="{B71E311C-0A10-D341-90A8-C9500DF18AB5}" type="datetime1">
               <a:rPr lang="de-DE" smtClean="0"/>
-              <a:t>29.06.15</a:t>
+              <a:t>30.06.15, </a:t>
             </a:fld>
             <a:endParaRPr lang="de-DE"/>
           </a:p>
@@ -4843,7 +5819,7 @@
           <a:p>
             <a:r>
               <a:rPr lang="de-DE" dirty="0" smtClean="0"/>
-              <a:t>Logger-App für </a:t>
+              <a:t>4. Logger-App für </a:t>
             </a:r>
             <a:r>
               <a:rPr lang="de-DE" dirty="0" err="1" smtClean="0"/>
@@ -4864,7 +5840,7 @@
           </p:nvPr>
         </p:nvPicPr>
         <p:blipFill>
-          <a:blip r:embed="rId2">
+          <a:blip r:embed="rId3">
             <a:extLst>
               <a:ext uri="{28A0092B-C50C-407E-A947-70E740481C1C}">
                 <a14:useLocalDpi xmlns:a14="http://schemas.microsoft.com/office/drawing/2010/main" val="0"/>
@@ -4909,7 +5885,7 @@
           <a:p>
             <a:fld id="{B71E311C-0A10-D341-90A8-C9500DF18AB5}" type="datetime1">
               <a:rPr lang="de-DE" smtClean="0"/>
-              <a:t>29.06.15</a:t>
+              <a:t>30.06.15, </a:t>
             </a:fld>
             <a:endParaRPr lang="de-DE"/>
           </a:p>
@@ -5008,7 +5984,7 @@
           <a:p>
             <a:r>
               <a:rPr lang="de-DE" dirty="0" smtClean="0"/>
-              <a:t>Logger-App für </a:t>
+              <a:t>4. Logger-App für </a:t>
             </a:r>
             <a:r>
               <a:rPr lang="de-DE" dirty="0" err="1" smtClean="0"/>
@@ -5029,7 +6005,175 @@
           </p:nvPr>
         </p:nvPicPr>
         <p:blipFill>
-          <a:blip r:embed="rId2">
+          <a:blip r:embed="rId3">
+            <a:extLst>
+              <a:ext uri="{28A0092B-C50C-407E-A947-70E740481C1C}">
+                <a14:useLocalDpi xmlns:a14="http://schemas.microsoft.com/office/drawing/2010/main" val="0"/>
+              </a:ext>
+            </a:extLst>
+          </a:blip>
+          <a:stretch>
+            <a:fillRect/>
+          </a:stretch>
+        </p:blipFill>
+        <p:spPr>
+          <a:xfrm>
+            <a:off x="2560461" y="1600200"/>
+            <a:ext cx="4023078" cy="4525962"/>
+          </a:xfrm>
+          <a:prstGeom prst="rect">
+            <a:avLst/>
+          </a:prstGeom>
+          <a:ln>
+            <a:noFill/>
+          </a:ln>
+          <a:effectLst>
+            <a:outerShdw blurRad="292100" dist="139700" dir="2700000" algn="tl" rotWithShape="0">
+              <a:srgbClr val="333333">
+                <a:alpha val="65000"/>
+              </a:srgbClr>
+            </a:outerShdw>
+          </a:effectLst>
+        </p:spPr>
+      </p:pic>
+      <p:sp>
+        <p:nvSpPr>
+          <p:cNvPr id="4" name="Datumsplatzhalter 3"/>
+          <p:cNvSpPr>
+            <a:spLocks noGrp="1"/>
+          </p:cNvSpPr>
+          <p:nvPr>
+            <p:ph type="dt" sz="half" idx="10"/>
+          </p:nvPr>
+        </p:nvSpPr>
+        <p:spPr/>
+        <p:txBody>
+          <a:bodyPr/>
+          <a:lstStyle/>
+          <a:p>
+            <a:fld id="{B71E311C-0A10-D341-90A8-C9500DF18AB5}" type="datetime1">
+              <a:rPr lang="de-DE" smtClean="0"/>
+              <a:t>30.06.15, </a:t>
+            </a:fld>
+            <a:endParaRPr lang="de-DE"/>
+          </a:p>
+        </p:txBody>
+      </p:sp>
+      <p:sp>
+        <p:nvSpPr>
+          <p:cNvPr id="5" name="Fußzeilenplatzhalter 4"/>
+          <p:cNvSpPr>
+            <a:spLocks noGrp="1"/>
+          </p:cNvSpPr>
+          <p:nvPr>
+            <p:ph type="ftr" sz="quarter" idx="11"/>
+          </p:nvPr>
+        </p:nvSpPr>
+        <p:spPr/>
+        <p:txBody>
+          <a:bodyPr/>
+          <a:lstStyle/>
+          <a:p>
+            <a:r>
+              <a:rPr lang="de-DE" smtClean="0"/>
+              <a:t>Christiane Göhring - Universität Bayreuth</a:t>
+            </a:r>
+            <a:endParaRPr lang="de-DE"/>
+          </a:p>
+        </p:txBody>
+      </p:sp>
+      <p:sp>
+        <p:nvSpPr>
+          <p:cNvPr id="6" name="Foliennummernplatzhalter 5"/>
+          <p:cNvSpPr>
+            <a:spLocks noGrp="1"/>
+          </p:cNvSpPr>
+          <p:nvPr>
+            <p:ph type="sldNum" sz="quarter" idx="12"/>
+          </p:nvPr>
+        </p:nvSpPr>
+        <p:spPr/>
+        <p:txBody>
+          <a:bodyPr/>
+          <a:lstStyle/>
+          <a:p>
+            <a:fld id="{B0D474F2-1736-FB43-A43C-22E97148F6B8}" type="slidenum">
+              <a:rPr lang="de-DE" smtClean="0"/>
+              <a:t>7</a:t>
+            </a:fld>
+            <a:endParaRPr lang="de-DE"/>
+          </a:p>
+        </p:txBody>
+      </p:sp>
+    </p:spTree>
+    <p:extLst>
+      <p:ext uri="{BB962C8B-B14F-4D97-AF65-F5344CB8AC3E}">
+        <p14:creationId xmlns:p14="http://schemas.microsoft.com/office/powerpoint/2010/main" val="910409879"/>
+      </p:ext>
+    </p:extLst>
+  </p:cSld>
+  <p:clrMapOvr>
+    <a:masterClrMapping/>
+  </p:clrMapOvr>
+</p:sld>
+</file>
+
+<file path=ppt/slides/slide8.xml><?xml version="1.0" encoding="utf-8"?>
+<p:sld xmlns:a="http://schemas.openxmlformats.org/drawingml/2006/main" xmlns:r="http://schemas.openxmlformats.org/officeDocument/2006/relationships" xmlns:p="http://schemas.openxmlformats.org/presentationml/2006/main">
+  <p:cSld>
+    <p:spTree>
+      <p:nvGrpSpPr>
+        <p:cNvPr id="1" name=""/>
+        <p:cNvGrpSpPr/>
+        <p:nvPr/>
+      </p:nvGrpSpPr>
+      <p:grpSpPr>
+        <a:xfrm>
+          <a:off x="0" y="0"/>
+          <a:ext cx="0" cy="0"/>
+          <a:chOff x="0" y="0"/>
+          <a:chExt cx="0" cy="0"/>
+        </a:xfrm>
+      </p:grpSpPr>
+      <p:sp>
+        <p:nvSpPr>
+          <p:cNvPr id="2" name="Titel 1"/>
+          <p:cNvSpPr>
+            <a:spLocks noGrp="1"/>
+          </p:cNvSpPr>
+          <p:nvPr>
+            <p:ph type="title"/>
+          </p:nvPr>
+        </p:nvSpPr>
+        <p:spPr/>
+        <p:txBody>
+          <a:bodyPr/>
+          <a:lstStyle/>
+          <a:p>
+            <a:r>
+              <a:rPr lang="de-DE" dirty="0" smtClean="0"/>
+              <a:t>4. Logger-App für </a:t>
+            </a:r>
+            <a:r>
+              <a:rPr lang="de-DE" dirty="0" err="1" smtClean="0"/>
+              <a:t>Android</a:t>
+            </a:r>
+            <a:endParaRPr lang="de-DE" dirty="0"/>
+          </a:p>
+        </p:txBody>
+      </p:sp>
+      <p:pic>
+        <p:nvPicPr>
+          <p:cNvPr id="7" name="Inhaltsplatzhalter 6"/>
+          <p:cNvPicPr>
+            <a:picLocks noGrp="1" noChangeAspect="1"/>
+          </p:cNvPicPr>
+          <p:nvPr>
+            <p:ph idx="1"/>
+          </p:nvPr>
+        </p:nvPicPr>
+        <p:blipFill>
+          <a:blip r:embed="rId3">
             <a:extLst>
               <a:ext uri="{28A0092B-C50C-407E-A947-70E740481C1C}">
                 <a14:useLocalDpi xmlns:a14="http://schemas.microsoft.com/office/drawing/2010/main" val="0"/>
@@ -5077,7 +6221,7 @@
           <a:p>
             <a:fld id="{B71E311C-0A10-D341-90A8-C9500DF18AB5}" type="datetime1">
               <a:rPr lang="de-DE" smtClean="0"/>
-              <a:t>29.06.15</a:t>
+              <a:t>30.06.15, </a:t>
             </a:fld>
             <a:endParaRPr lang="de-DE"/>
           </a:p>
@@ -5123,7 +6267,7 @@
           <a:p>
             <a:fld id="{B0D474F2-1736-FB43-A43C-22E97148F6B8}" type="slidenum">
               <a:rPr lang="de-DE" smtClean="0"/>
-              <a:t>7</a:t>
+              <a:t>8</a:t>
             </a:fld>
             <a:endParaRPr lang="de-DE"/>
           </a:p>
@@ -5142,7 +6286,7 @@
 </p:sld>
 </file>
 
-<file path=ppt/slides/slide8.xml><?xml version="1.0" encoding="utf-8"?>
+<file path=ppt/slides/slide9.xml><?xml version="1.0" encoding="utf-8"?>
 <p:sld xmlns:a="http://schemas.openxmlformats.org/drawingml/2006/main" xmlns:r="http://schemas.openxmlformats.org/officeDocument/2006/relationships" xmlns:p="http://schemas.openxmlformats.org/presentationml/2006/main">
   <p:cSld>
     <p:spTree>
@@ -5176,7 +6320,7 @@
           <a:p>
             <a:r>
               <a:rPr lang="de-DE" dirty="0" smtClean="0"/>
-              <a:t>Logger-App für </a:t>
+              <a:t>4. Logger-App für </a:t>
             </a:r>
             <a:r>
               <a:rPr lang="de-DE" dirty="0" err="1" smtClean="0"/>
@@ -5197,7 +6341,7 @@
           </p:nvPr>
         </p:nvPicPr>
         <p:blipFill>
-          <a:blip r:embed="rId2">
+          <a:blip r:embed="rId3">
             <a:extLst>
               <a:ext uri="{28A0092B-C50C-407E-A947-70E740481C1C}">
                 <a14:useLocalDpi xmlns:a14="http://schemas.microsoft.com/office/drawing/2010/main" val="0"/>
@@ -5245,175 +6389,7 @@
           <a:p>
             <a:fld id="{B71E311C-0A10-D341-90A8-C9500DF18AB5}" type="datetime1">
               <a:rPr lang="de-DE" smtClean="0"/>
-              <a:t>29.06.15</a:t>
-            </a:fld>
-            <a:endParaRPr lang="de-DE"/>
-          </a:p>
-        </p:txBody>
-      </p:sp>
-      <p:sp>
-        <p:nvSpPr>
-          <p:cNvPr id="5" name="Fußzeilenplatzhalter 4"/>
-          <p:cNvSpPr>
-            <a:spLocks noGrp="1"/>
-          </p:cNvSpPr>
-          <p:nvPr>
-            <p:ph type="ftr" sz="quarter" idx="11"/>
-          </p:nvPr>
-        </p:nvSpPr>
-        <p:spPr/>
-        <p:txBody>
-          <a:bodyPr/>
-          <a:lstStyle/>
-          <a:p>
-            <a:r>
-              <a:rPr lang="de-DE" smtClean="0"/>
-              <a:t>Christiane Göhring - Universität Bayreuth</a:t>
-            </a:r>
-            <a:endParaRPr lang="de-DE"/>
-          </a:p>
-        </p:txBody>
-      </p:sp>
-      <p:sp>
-        <p:nvSpPr>
-          <p:cNvPr id="6" name="Foliennummernplatzhalter 5"/>
-          <p:cNvSpPr>
-            <a:spLocks noGrp="1"/>
-          </p:cNvSpPr>
-          <p:nvPr>
-            <p:ph type="sldNum" sz="quarter" idx="12"/>
-          </p:nvPr>
-        </p:nvSpPr>
-        <p:spPr/>
-        <p:txBody>
-          <a:bodyPr/>
-          <a:lstStyle/>
-          <a:p>
-            <a:fld id="{B0D474F2-1736-FB43-A43C-22E97148F6B8}" type="slidenum">
-              <a:rPr lang="de-DE" smtClean="0"/>
-              <a:t>8</a:t>
-            </a:fld>
-            <a:endParaRPr lang="de-DE"/>
-          </a:p>
-        </p:txBody>
-      </p:sp>
-    </p:spTree>
-    <p:extLst>
-      <p:ext uri="{BB962C8B-B14F-4D97-AF65-F5344CB8AC3E}">
-        <p14:creationId xmlns:p14="http://schemas.microsoft.com/office/powerpoint/2010/main" val="910409879"/>
-      </p:ext>
-    </p:extLst>
-  </p:cSld>
-  <p:clrMapOvr>
-    <a:masterClrMapping/>
-  </p:clrMapOvr>
-</p:sld>
-</file>
-
-<file path=ppt/slides/slide9.xml><?xml version="1.0" encoding="utf-8"?>
-<p:sld xmlns:a="http://schemas.openxmlformats.org/drawingml/2006/main" xmlns:r="http://schemas.openxmlformats.org/officeDocument/2006/relationships" xmlns:p="http://schemas.openxmlformats.org/presentationml/2006/main">
-  <p:cSld>
-    <p:spTree>
-      <p:nvGrpSpPr>
-        <p:cNvPr id="1" name=""/>
-        <p:cNvGrpSpPr/>
-        <p:nvPr/>
-      </p:nvGrpSpPr>
-      <p:grpSpPr>
-        <a:xfrm>
-          <a:off x="0" y="0"/>
-          <a:ext cx="0" cy="0"/>
-          <a:chOff x="0" y="0"/>
-          <a:chExt cx="0" cy="0"/>
-        </a:xfrm>
-      </p:grpSpPr>
-      <p:sp>
-        <p:nvSpPr>
-          <p:cNvPr id="2" name="Titel 1"/>
-          <p:cNvSpPr>
-            <a:spLocks noGrp="1"/>
-          </p:cNvSpPr>
-          <p:nvPr>
-            <p:ph type="title"/>
-          </p:nvPr>
-        </p:nvSpPr>
-        <p:spPr/>
-        <p:txBody>
-          <a:bodyPr/>
-          <a:lstStyle/>
-          <a:p>
-            <a:r>
-              <a:rPr lang="de-DE" dirty="0" smtClean="0"/>
-              <a:t>Logger-App für </a:t>
-            </a:r>
-            <a:r>
-              <a:rPr lang="de-DE" dirty="0" err="1" smtClean="0"/>
-              <a:t>Android</a:t>
-            </a:r>
-            <a:endParaRPr lang="de-DE" dirty="0"/>
-          </a:p>
-        </p:txBody>
-      </p:sp>
-      <p:pic>
-        <p:nvPicPr>
-          <p:cNvPr id="7" name="Inhaltsplatzhalter 6"/>
-          <p:cNvPicPr>
-            <a:picLocks noGrp="1" noChangeAspect="1"/>
-          </p:cNvPicPr>
-          <p:nvPr>
-            <p:ph idx="1"/>
-          </p:nvPr>
-        </p:nvPicPr>
-        <p:blipFill>
-          <a:blip r:embed="rId2">
-            <a:extLst>
-              <a:ext uri="{28A0092B-C50C-407E-A947-70E740481C1C}">
-                <a14:useLocalDpi xmlns:a14="http://schemas.microsoft.com/office/drawing/2010/main" val="0"/>
-              </a:ext>
-            </a:extLst>
-          </a:blip>
-          <a:stretch>
-            <a:fillRect/>
-          </a:stretch>
-        </p:blipFill>
-        <p:spPr>
-          <a:xfrm>
-            <a:off x="2560461" y="1600200"/>
-            <a:ext cx="4023078" cy="4525963"/>
-          </a:xfrm>
-          <a:prstGeom prst="rect">
-            <a:avLst/>
-          </a:prstGeom>
-          <a:ln>
-            <a:noFill/>
-          </a:ln>
-          <a:effectLst>
-            <a:outerShdw blurRad="292100" dist="139700" dir="2700000" algn="tl" rotWithShape="0">
-              <a:srgbClr val="333333">
-                <a:alpha val="65000"/>
-              </a:srgbClr>
-            </a:outerShdw>
-          </a:effectLst>
-        </p:spPr>
-      </p:pic>
-      <p:sp>
-        <p:nvSpPr>
-          <p:cNvPr id="4" name="Datumsplatzhalter 3"/>
-          <p:cNvSpPr>
-            <a:spLocks noGrp="1"/>
-          </p:cNvSpPr>
-          <p:nvPr>
-            <p:ph type="dt" sz="half" idx="10"/>
-          </p:nvPr>
-        </p:nvSpPr>
-        <p:spPr/>
-        <p:txBody>
-          <a:bodyPr/>
-          <a:lstStyle/>
-          <a:p>
-            <a:fld id="{B71E311C-0A10-D341-90A8-C9500DF18AB5}" type="datetime1">
-              <a:rPr lang="de-DE" smtClean="0"/>
-              <a:t>29.06.15</a:t>
+              <a:t>30.06.15, </a:t>
             </a:fld>
             <a:endParaRPr lang="de-DE"/>
           </a:p>

</xml_diff>